<commit_message>
add the missing repo link in pptx
</commit_message>
<xml_diff>
--- a/oop final project.pptx
+++ b/oop final project.pptx
@@ -22418,8 +22418,8 @@
         </p:nvSpPr>
         <p:spPr bwMode="auto">
           <a:xfrm>
-            <a:off x="610848" y="1290199"/>
-            <a:ext cx="10201409" cy="5013039"/>
+            <a:off x="377018" y="1288549"/>
+            <a:ext cx="11591170" cy="5013039"/>
           </a:xfrm>
           <a:prstGeom prst="rect">
             <a:avLst/>
@@ -22487,7 +22487,28 @@
                 <a:latin typeface="微软雅黑" pitchFamily="34" charset="-122"/>
                 <a:ea typeface="微软雅黑" pitchFamily="34" charset="-122"/>
               </a:rPr>
-              <a:t>()</a:t>
+              <a:t>(</a:t>
+            </a:r>
+            <a:r>
+              <a:rPr lang="en-US" altLang="zh-TW" sz="2400" dirty="0">
+                <a:solidFill>
+                  <a:srgbClr val="3B3B3B"/>
+                </a:solidFill>
+                <a:latin typeface="微软雅黑" pitchFamily="34" charset="-122"/>
+                <a:ea typeface="微软雅黑" pitchFamily="34" charset="-122"/>
+                <a:hlinkClick r:id="rId2"/>
+              </a:rPr>
+              <a:t>https://github.com/wszqkzqk/pypvz</a:t>
+            </a:r>
+            <a:r>
+              <a:rPr lang="en-US" altLang="zh-TW" sz="2400" dirty="0">
+                <a:solidFill>
+                  <a:srgbClr val="3B3B3B"/>
+                </a:solidFill>
+                <a:latin typeface="微软雅黑" pitchFamily="34" charset="-122"/>
+                <a:ea typeface="微软雅黑" pitchFamily="34" charset="-122"/>
+              </a:rPr>
+              <a:t>)</a:t>
             </a:r>
             <a:r>
               <a:rPr lang="zh-TW" altLang="en-US" sz="2400" dirty="0">

</xml_diff>

<commit_message>
pptx comments removed && add a new feature
</commit_message>
<xml_diff>
--- a/oop final project.pptx
+++ b/oop final project.pptx
@@ -3704,88 +3704,6 @@
           </a:prstGeom>
         </p:spPr>
       </p:pic>
-      <p:sp>
-        <p:nvSpPr>
-          <p:cNvPr id="3" name="Text Box 147">
-            <a:extLst>
-              <a:ext uri="{FF2B5EF4-FFF2-40B4-BE49-F238E27FC236}">
-                <a16:creationId xmlns:a16="http://schemas.microsoft.com/office/drawing/2014/main" id="{40C62C35-D661-6EC3-EA29-6A723BC38F20}"/>
-              </a:ext>
-            </a:extLst>
-          </p:cNvPr>
-          <p:cNvSpPr txBox="1">
-            <a:spLocks noChangeArrowheads="1"/>
-          </p:cNvSpPr>
-          <p:nvPr/>
-        </p:nvSpPr>
-        <p:spPr bwMode="auto">
-          <a:xfrm>
-            <a:off x="5988065" y="676420"/>
-            <a:ext cx="4237858" cy="954107"/>
-          </a:xfrm>
-          <a:prstGeom prst="rect">
-            <a:avLst/>
-          </a:prstGeom>
-          <a:noFill/>
-          <a:ln>
-            <a:noFill/>
-          </a:ln>
-          <a:effectLst/>
-          <a:extLst>
-            <a:ext uri="{909E8E84-426E-40DD-AFC4-6F175D3DCCD1}">
-              <a14:hiddenFill xmlns:a14="http://schemas.microsoft.com/office/drawing/2010/main">
-                <a:solidFill>
-                  <a:schemeClr val="accent1"/>
-                </a:solidFill>
-              </a14:hiddenFill>
-            </a:ext>
-            <a:ext uri="{91240B29-F687-4F45-9708-019B960494DF}">
-              <a14:hiddenLine xmlns:a14="http://schemas.microsoft.com/office/drawing/2010/main" w="9525">
-                <a:solidFill>
-                  <a:schemeClr val="tx1"/>
-                </a:solidFill>
-                <a:miter lim="800000"/>
-                <a:headEnd/>
-                <a:tailEnd/>
-              </a14:hiddenLine>
-            </a:ext>
-            <a:ext uri="{AF507438-7753-43E0-B8FC-AC1667EBCBE1}">
-              <a14:hiddenEffects xmlns:a14="http://schemas.microsoft.com/office/drawing/2010/main">
-                <a:effectLst>
-                  <a:outerShdw dist="35921" dir="2700000" algn="ctr" rotWithShape="0">
-                    <a:schemeClr val="bg2"/>
-                  </a:outerShdw>
-                </a:effectLst>
-              </a14:hiddenEffects>
-            </a:ext>
-          </a:extLst>
-        </p:spPr>
-        <p:txBody>
-          <a:bodyPr wrap="square" lIns="0">
-            <a:spAutoFit/>
-          </a:bodyPr>
-          <a:lstStyle/>
-          <a:p>
-            <a:r>
-              <a:rPr lang="zh-TW" altLang="en-US" sz="2800" b="1" dirty="0">
-                <a:solidFill>
-                  <a:srgbClr val="FF0000"/>
-                </a:solidFill>
-                <a:latin typeface="微软雅黑" pitchFamily="34" charset="-122"/>
-                <a:ea typeface="微软雅黑" pitchFamily="34" charset="-122"/>
-              </a:rPr>
-              <a:t>總感覺這模板有點簡陋，看要不要換一個</a:t>
-            </a:r>
-            <a:endParaRPr lang="zh-CN" altLang="en-US" sz="2800" b="1" dirty="0">
-              <a:solidFill>
-                <a:srgbClr val="FF0000"/>
-              </a:solidFill>
-              <a:latin typeface="微软雅黑" pitchFamily="34" charset="-122"/>
-              <a:ea typeface="微软雅黑" pitchFamily="34" charset="-122"/>
-            </a:endParaRPr>
-          </a:p>
-        </p:txBody>
-      </p:sp>
     </p:spTree>
   </p:cSld>
   <p:clrMapOvr>
@@ -7858,8 +7776,8 @@
         </p:nvSpPr>
         <p:spPr bwMode="auto">
           <a:xfrm>
-            <a:off x="281876" y="1558217"/>
-            <a:ext cx="513282" cy="523220"/>
+            <a:off x="377018" y="1458757"/>
+            <a:ext cx="1970567" cy="523220"/>
           </a:xfrm>
           <a:prstGeom prst="rect">
             <a:avLst/>
@@ -7899,7 +7817,7 @@
           </a:extLst>
         </p:spPr>
         <p:txBody>
-          <a:bodyPr wrap="none">
+          <a:bodyPr wrap="square">
             <a:spAutoFit/>
           </a:bodyPr>
           <a:lstStyle/>
@@ -7912,7 +7830,7 @@
                 </a:solidFill>
                 <a:latin typeface="Impact" pitchFamily="34" charset="0"/>
               </a:rPr>
-              <a:t>01</a:t>
+              <a:t>PROBLEM 01</a:t>
             </a:r>
           </a:p>
         </p:txBody>
@@ -7933,7 +7851,7 @@
         </p:nvSpPr>
         <p:spPr bwMode="auto">
           <a:xfrm>
-            <a:off x="949406" y="1411782"/>
+            <a:off x="600742" y="1995161"/>
             <a:ext cx="9847327" cy="3894208"/>
           </a:xfrm>
           <a:prstGeom prst="rect">
@@ -10172,8 +10090,8 @@
         </p:nvSpPr>
         <p:spPr bwMode="auto">
           <a:xfrm>
-            <a:off x="175640" y="1773485"/>
-            <a:ext cx="556563" cy="523220"/>
+            <a:off x="401304" y="1990385"/>
+            <a:ext cx="2321096" cy="523220"/>
           </a:xfrm>
           <a:prstGeom prst="rect">
             <a:avLst/>
@@ -10213,7 +10131,7 @@
           </a:extLst>
         </p:spPr>
         <p:txBody>
-          <a:bodyPr wrap="none">
+          <a:bodyPr wrap="square">
             <a:spAutoFit/>
           </a:bodyPr>
           <a:lstStyle/>
@@ -10225,7 +10143,7 @@
                 </a:solidFill>
                 <a:latin typeface="Impact" pitchFamily="34" charset="0"/>
               </a:rPr>
-              <a:t>02</a:t>
+              <a:t>PROBLEM  02</a:t>
             </a:r>
           </a:p>
         </p:txBody>
@@ -10246,7 +10164,7 @@
         </p:nvSpPr>
         <p:spPr bwMode="auto">
           <a:xfrm>
-            <a:off x="732203" y="1654822"/>
+            <a:off x="453922" y="2594214"/>
             <a:ext cx="11185465" cy="2601546"/>
           </a:xfrm>
           <a:prstGeom prst="rect">
@@ -10416,82 +10334,6 @@
               <a:latin typeface="微软雅黑" pitchFamily="34" charset="-122"/>
               <a:ea typeface="微软雅黑" pitchFamily="34" charset="-122"/>
             </a:endParaRPr>
-          </a:p>
-        </p:txBody>
-      </p:sp>
-      <p:sp>
-        <p:nvSpPr>
-          <p:cNvPr id="2" name="Text Box 147">
-            <a:extLst>
-              <a:ext uri="{FF2B5EF4-FFF2-40B4-BE49-F238E27FC236}">
-                <a16:creationId xmlns:a16="http://schemas.microsoft.com/office/drawing/2014/main" id="{506E5E53-D850-724D-692F-5D2266682277}"/>
-              </a:ext>
-            </a:extLst>
-          </p:cNvPr>
-          <p:cNvSpPr txBox="1">
-            <a:spLocks noChangeArrowheads="1"/>
-          </p:cNvSpPr>
-          <p:nvPr/>
-        </p:nvSpPr>
-        <p:spPr bwMode="auto">
-          <a:xfrm>
-            <a:off x="1103445" y="5115378"/>
-            <a:ext cx="8387734" cy="523220"/>
-          </a:xfrm>
-          <a:prstGeom prst="rect">
-            <a:avLst/>
-          </a:prstGeom>
-          <a:noFill/>
-          <a:ln>
-            <a:noFill/>
-          </a:ln>
-          <a:effectLst/>
-          <a:extLst>
-            <a:ext uri="{909E8E84-426E-40DD-AFC4-6F175D3DCCD1}">
-              <a14:hiddenFill xmlns:a14="http://schemas.microsoft.com/office/drawing/2010/main">
-                <a:solidFill>
-                  <a:schemeClr val="accent1"/>
-                </a:solidFill>
-              </a14:hiddenFill>
-            </a:ext>
-            <a:ext uri="{91240B29-F687-4F45-9708-019B960494DF}">
-              <a14:hiddenLine xmlns:a14="http://schemas.microsoft.com/office/drawing/2010/main" w="9525">
-                <a:solidFill>
-                  <a:schemeClr val="tx1"/>
-                </a:solidFill>
-                <a:miter lim="800000"/>
-                <a:headEnd/>
-                <a:tailEnd/>
-              </a14:hiddenLine>
-            </a:ext>
-            <a:ext uri="{AF507438-7753-43E0-B8FC-AC1667EBCBE1}">
-              <a14:hiddenEffects xmlns:a14="http://schemas.microsoft.com/office/drawing/2010/main">
-                <a:effectLst>
-                  <a:outerShdw dist="35921" dir="2700000" algn="ctr" rotWithShape="0">
-                    <a:schemeClr val="bg2"/>
-                  </a:outerShdw>
-                </a:effectLst>
-              </a14:hiddenEffects>
-            </a:ext>
-          </a:extLst>
-        </p:spPr>
-        <p:txBody>
-          <a:bodyPr wrap="square" lIns="0">
-            <a:spAutoFit/>
-          </a:bodyPr>
-          <a:lstStyle/>
-          <a:p>
-            <a:pPr algn="ctr"/>
-            <a:r>
-              <a:rPr lang="en-US" altLang="zh-TW" sz="2800" b="1" dirty="0">
-                <a:solidFill>
-                  <a:srgbClr val="FF0000"/>
-                </a:solidFill>
-                <a:latin typeface="微软雅黑" pitchFamily="34" charset="-122"/>
-                <a:ea typeface="微软雅黑" pitchFamily="34" charset="-122"/>
-              </a:rPr>
-              <a:t>Add at least two more encountered problems</a:t>
-            </a:r>
           </a:p>
         </p:txBody>
       </p:sp>
@@ -29197,8 +29039,8 @@
         </p:nvSpPr>
         <p:spPr bwMode="auto">
           <a:xfrm>
-            <a:off x="377018" y="1225928"/>
-            <a:ext cx="11635825" cy="5177187"/>
+            <a:off x="662663" y="1355793"/>
+            <a:ext cx="11635825" cy="5170646"/>
           </a:xfrm>
           <a:prstGeom prst="rect">
             <a:avLst/>
@@ -29244,14 +29086,11 @@
           <a:lstStyle/>
           <a:p>
             <a:pPr marL="457200" indent="-457200">
-              <a:lnSpc>
-                <a:spcPct val="150000"/>
-              </a:lnSpc>
               <a:spcBef>
-                <a:spcPts val="400"/>
+                <a:spcPts val="600"/>
               </a:spcBef>
               <a:spcAft>
-                <a:spcPts val="400"/>
+                <a:spcPts val="600"/>
               </a:spcAft>
               <a:buFont typeface="Wingdings" panose="05000000000000000000" pitchFamily="2" charset="2"/>
               <a:buChar char="l"/>
@@ -29276,14 +29115,11 @@
           </a:p>
           <a:p>
             <a:pPr>
-              <a:lnSpc>
-                <a:spcPct val="150000"/>
-              </a:lnSpc>
               <a:spcBef>
-                <a:spcPts val="400"/>
+                <a:spcPts val="600"/>
               </a:spcBef>
               <a:spcAft>
-                <a:spcPts val="400"/>
+                <a:spcPts val="600"/>
               </a:spcAft>
             </a:pPr>
             <a:r>
@@ -29316,14 +29152,11 @@
           </a:p>
           <a:p>
             <a:pPr marL="457200" indent="-457200">
-              <a:lnSpc>
-                <a:spcPct val="150000"/>
-              </a:lnSpc>
               <a:spcBef>
-                <a:spcPts val="400"/>
+                <a:spcPts val="600"/>
               </a:spcBef>
               <a:spcAft>
-                <a:spcPts val="400"/>
+                <a:spcPts val="600"/>
               </a:spcAft>
               <a:buFont typeface="Wingdings" panose="05000000000000000000" pitchFamily="2" charset="2"/>
               <a:buChar char="l"/>
@@ -29348,14 +29181,11 @@
           </a:p>
           <a:p>
             <a:pPr>
-              <a:lnSpc>
-                <a:spcPct val="150000"/>
-              </a:lnSpc>
               <a:spcBef>
-                <a:spcPts val="400"/>
+                <a:spcPts val="600"/>
               </a:spcBef>
               <a:spcAft>
-                <a:spcPts val="400"/>
+                <a:spcPts val="600"/>
               </a:spcAft>
             </a:pPr>
             <a:r>
@@ -29388,14 +29218,11 @@
           </a:p>
           <a:p>
             <a:pPr marL="457200" indent="-457200">
-              <a:lnSpc>
-                <a:spcPct val="150000"/>
-              </a:lnSpc>
               <a:spcBef>
-                <a:spcPts val="400"/>
+                <a:spcPts val="600"/>
               </a:spcBef>
               <a:spcAft>
-                <a:spcPts val="400"/>
+                <a:spcPts val="600"/>
               </a:spcAft>
               <a:buFont typeface="Wingdings" panose="05000000000000000000" pitchFamily="2" charset="2"/>
               <a:buChar char="l"/>
@@ -29440,14 +29267,11 @@
           </a:p>
           <a:p>
             <a:pPr>
-              <a:lnSpc>
-                <a:spcPct val="150000"/>
-              </a:lnSpc>
               <a:spcBef>
-                <a:spcPts val="400"/>
+                <a:spcPts val="600"/>
               </a:spcBef>
               <a:spcAft>
-                <a:spcPts val="400"/>
+                <a:spcPts val="600"/>
               </a:spcAft>
             </a:pPr>
             <a:r>
@@ -29480,14 +29304,11 @@
           </a:p>
           <a:p>
             <a:pPr marL="457200" indent="-457200">
-              <a:lnSpc>
-                <a:spcPct val="150000"/>
-              </a:lnSpc>
               <a:spcBef>
-                <a:spcPts val="400"/>
+                <a:spcPts val="600"/>
               </a:spcBef>
               <a:spcAft>
-                <a:spcPts val="400"/>
+                <a:spcPts val="600"/>
               </a:spcAft>
               <a:buFont typeface="Wingdings" panose="05000000000000000000" pitchFamily="2" charset="2"/>
               <a:buChar char="l"/>
@@ -29522,14 +29343,11 @@
           </a:p>
           <a:p>
             <a:pPr>
-              <a:lnSpc>
-                <a:spcPct val="150000"/>
-              </a:lnSpc>
               <a:spcBef>
-                <a:spcPts val="400"/>
+                <a:spcPts val="600"/>
               </a:spcBef>
               <a:spcAft>
-                <a:spcPts val="400"/>
+                <a:spcPts val="600"/>
               </a:spcAft>
             </a:pPr>
             <a:r>
@@ -29551,6 +29369,79 @@
                 <a:ea typeface="微软雅黑" pitchFamily="34" charset="-122"/>
               </a:rPr>
               <a:t>打造幽默且創意的角色設計，提升視覺吸引力</a:t>
+            </a:r>
+            <a:endParaRPr lang="en-US" altLang="zh-TW" sz="2400" dirty="0">
+              <a:solidFill>
+                <a:srgbClr val="3B3B3B"/>
+              </a:solidFill>
+              <a:latin typeface="微软雅黑" pitchFamily="34" charset="-122"/>
+              <a:ea typeface="微软雅黑" pitchFamily="34" charset="-122"/>
+            </a:endParaRPr>
+          </a:p>
+          <a:p>
+            <a:pPr marL="342900" indent="-342900">
+              <a:spcBef>
+                <a:spcPts val="600"/>
+              </a:spcBef>
+              <a:spcAft>
+                <a:spcPts val="600"/>
+              </a:spcAft>
+              <a:buFont typeface="Wingdings" panose="05000000000000000000" pitchFamily="2" charset="2"/>
+              <a:buChar char="l"/>
+            </a:pPr>
+            <a:r>
+              <a:rPr lang="zh-TW" altLang="en-US" sz="2400" b="1" dirty="0">
+                <a:latin typeface="微软雅黑" pitchFamily="34" charset="-122"/>
+                <a:ea typeface="微软雅黑" pitchFamily="34" charset="-122"/>
+              </a:rPr>
+              <a:t> 線上遊玩功能</a:t>
+            </a:r>
+            <a:r>
+              <a:rPr lang="en-US" altLang="zh-TW" sz="2400" b="1" dirty="0">
+                <a:latin typeface="微软雅黑" pitchFamily="34" charset="-122"/>
+                <a:ea typeface="微软雅黑" pitchFamily="34" charset="-122"/>
+              </a:rPr>
+              <a:t>:</a:t>
+            </a:r>
+          </a:p>
+          <a:p>
+            <a:pPr>
+              <a:spcBef>
+                <a:spcPts val="600"/>
+              </a:spcBef>
+              <a:spcAft>
+                <a:spcPts val="600"/>
+              </a:spcAft>
+            </a:pPr>
+            <a:r>
+              <a:rPr lang="zh-TW" altLang="en-US" sz="2400" dirty="0">
+                <a:solidFill>
+                  <a:srgbClr val="3B3B3B"/>
+                </a:solidFill>
+                <a:latin typeface="微软雅黑" pitchFamily="34" charset="-122"/>
+                <a:ea typeface="微软雅黑" pitchFamily="34" charset="-122"/>
+              </a:rPr>
+              <a:t>    我們有把遊戲放到</a:t>
+            </a:r>
+            <a:r>
+              <a:rPr lang="en-US" altLang="zh-TW" sz="2400" dirty="0" err="1">
+                <a:solidFill>
+                  <a:srgbClr val="3B3B3B"/>
+                </a:solidFill>
+                <a:latin typeface="微软雅黑" pitchFamily="34" charset="-122"/>
+                <a:ea typeface="微软雅黑" pitchFamily="34" charset="-122"/>
+              </a:rPr>
+              <a:t>Replit</a:t>
+            </a:r>
+            <a:r>
+              <a:rPr lang="zh-TW" altLang="en-US" sz="2400" dirty="0">
+                <a:solidFill>
+                  <a:srgbClr val="3B3B3B"/>
+                </a:solidFill>
+                <a:latin typeface="微软雅黑" pitchFamily="34" charset="-122"/>
+                <a:ea typeface="微软雅黑" pitchFamily="34" charset="-122"/>
+              </a:rPr>
+              <a:t>上，有空的人可以去玩</a:t>
             </a:r>
             <a:endParaRPr lang="en-US" altLang="zh-TW" sz="2400" dirty="0">
               <a:solidFill>
@@ -40335,8 +40226,8 @@
         </p:nvSpPr>
         <p:spPr bwMode="auto">
           <a:xfrm>
-            <a:off x="377018" y="1568444"/>
-            <a:ext cx="6557831" cy="4585871"/>
+            <a:off x="538517" y="1603885"/>
+            <a:ext cx="6557831" cy="5093702"/>
           </a:xfrm>
           <a:prstGeom prst="rect">
             <a:avLst/>
@@ -40390,44 +40281,12 @@
               </a:spcAft>
             </a:pPr>
             <a:r>
-              <a:rPr lang="zh-TW" altLang="en-US" sz="2800" b="1" dirty="0">
-                <a:latin typeface="微软雅黑" pitchFamily="34" charset="-122"/>
-                <a:ea typeface="微软雅黑" pitchFamily="34" charset="-122"/>
-              </a:rPr>
-              <a:t>生存模式（位於</a:t>
-            </a:r>
-            <a:r>
               <a:rPr lang="en-US" altLang="zh-TW" sz="2800" b="1" dirty="0">
                 <a:latin typeface="微软雅黑" pitchFamily="34" charset="-122"/>
                 <a:ea typeface="微软雅黑" pitchFamily="34" charset="-122"/>
               </a:rPr>
-              <a:t>class</a:t>
+              <a:t>Survival Mode</a:t>
             </a:r>
-            <a:r>
-              <a:rPr lang="zh-TW" altLang="en-US" sz="2800" b="1" dirty="0">
-                <a:latin typeface="微软雅黑" pitchFamily="34" charset="-122"/>
-                <a:ea typeface="微软雅黑" pitchFamily="34" charset="-122"/>
-              </a:rPr>
-              <a:t> </a:t>
-            </a:r>
-            <a:r>
-              <a:rPr lang="en-US" altLang="zh-TW" sz="2800" b="1" dirty="0">
-                <a:latin typeface="微软雅黑" pitchFamily="34" charset="-122"/>
-                <a:ea typeface="微软雅黑" pitchFamily="34" charset="-122"/>
-              </a:rPr>
-              <a:t>Level</a:t>
-            </a:r>
-            <a:r>
-              <a:rPr lang="zh-TW" altLang="en-US" sz="2800" b="1" dirty="0">
-                <a:latin typeface="微软雅黑" pitchFamily="34" charset="-122"/>
-                <a:ea typeface="微软雅黑" pitchFamily="34" charset="-122"/>
-              </a:rPr>
-              <a:t>內）</a:t>
-            </a:r>
-            <a:endParaRPr lang="en-US" altLang="zh-TW" sz="2800" b="1" dirty="0">
-              <a:latin typeface="微软雅黑" pitchFamily="34" charset="-122"/>
-              <a:ea typeface="微软雅黑" pitchFamily="34" charset="-122"/>
-            </a:endParaRPr>
           </a:p>
           <a:p>
             <a:pPr marL="457200" indent="-457200">
@@ -40474,57 +40333,6 @@
                 <a:ea typeface="微软雅黑" pitchFamily="34" charset="-122"/>
               </a:rPr>
               <a:t>設定需克服的旗幟數量</a:t>
-            </a:r>
-            <a:endParaRPr lang="en-US" altLang="zh-TW" sz="2800" dirty="0">
-              <a:latin typeface="微软雅黑" pitchFamily="34" charset="-122"/>
-              <a:ea typeface="微软雅黑" pitchFamily="34" charset="-122"/>
-            </a:endParaRPr>
-          </a:p>
-          <a:p>
-            <a:pPr marL="457200" indent="-457200">
-              <a:spcBef>
-                <a:spcPts val="300"/>
-              </a:spcBef>
-              <a:spcAft>
-                <a:spcPts val="300"/>
-              </a:spcAft>
-              <a:buFont typeface="Arial" panose="020B0604020202020204" pitchFamily="34" charset="0"/>
-              <a:buChar char="•"/>
-            </a:pPr>
-            <a:r>
-              <a:rPr lang="en-US" altLang="zh-TW" sz="2800" b="1" dirty="0" err="1">
-                <a:latin typeface="微软雅黑" pitchFamily="34" charset="-122"/>
-                <a:ea typeface="微软雅黑" pitchFamily="34" charset="-122"/>
-              </a:rPr>
-              <a:t>survival_rounds</a:t>
-            </a:r>
-            <a:r>
-              <a:rPr lang="zh-TW" altLang="en-US" sz="2800" b="1" dirty="0">
-                <a:latin typeface="微软雅黑" pitchFamily="34" charset="-122"/>
-                <a:ea typeface="微软雅黑" pitchFamily="34" charset="-122"/>
-              </a:rPr>
-              <a:t>：</a:t>
-            </a:r>
-            <a:endParaRPr lang="en-US" altLang="zh-TW" sz="2800" b="1" dirty="0">
-              <a:latin typeface="微软雅黑" pitchFamily="34" charset="-122"/>
-              <a:ea typeface="微软雅黑" pitchFamily="34" charset="-122"/>
-            </a:endParaRPr>
-          </a:p>
-          <a:p>
-            <a:pPr>
-              <a:spcBef>
-                <a:spcPts val="300"/>
-              </a:spcBef>
-              <a:spcAft>
-                <a:spcPts val="300"/>
-              </a:spcAft>
-            </a:pPr>
-            <a:r>
-              <a:rPr lang="zh-TW" altLang="en-US" sz="2800" dirty="0">
-                <a:latin typeface="微软雅黑" pitchFamily="34" charset="-122"/>
-                <a:ea typeface="微软雅黑" pitchFamily="34" charset="-122"/>
-              </a:rPr>
-              <a:t>記錄已克服的旗幟數，用於動態調整難度</a:t>
             </a:r>
             <a:endParaRPr lang="en-US" altLang="zh-TW" sz="2800" dirty="0">
               <a:latin typeface="微软雅黑" pitchFamily="34" charset="-122"/>
@@ -40642,6 +40450,71 @@
               </a:rPr>
               <a:t>根據遊戲進度生成殭屍波次</a:t>
             </a:r>
+            <a:endParaRPr lang="en-US" altLang="zh-TW" sz="2800" dirty="0">
+              <a:latin typeface="微软雅黑" pitchFamily="34" charset="-122"/>
+              <a:ea typeface="微软雅黑" pitchFamily="34" charset="-122"/>
+            </a:endParaRPr>
+          </a:p>
+          <a:p>
+            <a:pPr marL="457200" indent="-457200">
+              <a:spcBef>
+                <a:spcPts val="300"/>
+              </a:spcBef>
+              <a:spcAft>
+                <a:spcPts val="300"/>
+              </a:spcAft>
+              <a:buFont typeface="Arial" panose="020B0604020202020204" pitchFamily="34" charset="0"/>
+              <a:buChar char="•"/>
+            </a:pPr>
+            <a:r>
+              <a:rPr lang="en-US" altLang="zh-TW" sz="2800" b="1" dirty="0" err="1">
+                <a:latin typeface="微软雅黑" pitchFamily="34" charset="-122"/>
+                <a:ea typeface="微软雅黑" pitchFamily="34" charset="-122"/>
+              </a:rPr>
+              <a:t>survival_rounds</a:t>
+            </a:r>
+            <a:r>
+              <a:rPr lang="zh-TW" altLang="en-US" sz="2800" b="1" dirty="0">
+                <a:latin typeface="微软雅黑" pitchFamily="34" charset="-122"/>
+                <a:ea typeface="微软雅黑" pitchFamily="34" charset="-122"/>
+              </a:rPr>
+              <a:t>：</a:t>
+            </a:r>
+            <a:endParaRPr lang="en-US" altLang="zh-TW" sz="2800" b="1" dirty="0">
+              <a:latin typeface="微软雅黑" pitchFamily="34" charset="-122"/>
+              <a:ea typeface="微软雅黑" pitchFamily="34" charset="-122"/>
+            </a:endParaRPr>
+          </a:p>
+          <a:p>
+            <a:pPr>
+              <a:spcBef>
+                <a:spcPts val="300"/>
+              </a:spcBef>
+              <a:spcAft>
+                <a:spcPts val="300"/>
+              </a:spcAft>
+            </a:pPr>
+            <a:r>
+              <a:rPr lang="zh-TW" altLang="en-US" sz="2800" dirty="0">
+                <a:latin typeface="微软雅黑" pitchFamily="34" charset="-122"/>
+                <a:ea typeface="微软雅黑" pitchFamily="34" charset="-122"/>
+              </a:rPr>
+              <a:t>記錄已克服的旗幟數，用於動態調整難度</a:t>
+            </a:r>
+            <a:endParaRPr lang="en-US" altLang="zh-TW" sz="2800" dirty="0">
+              <a:latin typeface="微软雅黑" pitchFamily="34" charset="-122"/>
+              <a:ea typeface="微软雅黑" pitchFamily="34" charset="-122"/>
+            </a:endParaRPr>
+          </a:p>
+          <a:p>
+            <a:pPr>
+              <a:spcBef>
+                <a:spcPts val="300"/>
+              </a:spcBef>
+              <a:spcAft>
+                <a:spcPts val="300"/>
+              </a:spcAft>
+            </a:pPr>
             <a:endParaRPr lang="zh-CN" altLang="en-US" sz="2800" b="1" dirty="0">
               <a:solidFill>
                 <a:srgbClr val="FF0000"/>
@@ -40652,6 +40525,66 @@
           </a:p>
         </p:txBody>
       </p:sp>
+      <p:pic>
+        <p:nvPicPr>
+          <p:cNvPr id="5" name="圖片 4">
+            <a:extLst>
+              <a:ext uri="{FF2B5EF4-FFF2-40B4-BE49-F238E27FC236}">
+                <a16:creationId xmlns:a16="http://schemas.microsoft.com/office/drawing/2014/main" id="{98230E5C-67B7-A429-5F1A-68EF47A90A55}"/>
+              </a:ext>
+            </a:extLst>
+          </p:cNvPr>
+          <p:cNvPicPr>
+            <a:picLocks noChangeAspect="1"/>
+          </p:cNvPicPr>
+          <p:nvPr/>
+        </p:nvPicPr>
+        <p:blipFill>
+          <a:blip r:embed="rId2"/>
+          <a:stretch>
+            <a:fillRect/>
+          </a:stretch>
+        </p:blipFill>
+        <p:spPr>
+          <a:xfrm>
+            <a:off x="5057263" y="290560"/>
+            <a:ext cx="6757719" cy="2518738"/>
+          </a:xfrm>
+          <a:prstGeom prst="rect">
+            <a:avLst/>
+          </a:prstGeom>
+        </p:spPr>
+      </p:pic>
+      <p:pic>
+        <p:nvPicPr>
+          <p:cNvPr id="7" name="圖片 6">
+            <a:extLst>
+              <a:ext uri="{FF2B5EF4-FFF2-40B4-BE49-F238E27FC236}">
+                <a16:creationId xmlns:a16="http://schemas.microsoft.com/office/drawing/2014/main" id="{F8DBE8F0-DC82-1067-1FCE-AD96C7FBD898}"/>
+              </a:ext>
+            </a:extLst>
+          </p:cNvPr>
+          <p:cNvPicPr>
+            <a:picLocks noChangeAspect="1"/>
+          </p:cNvPicPr>
+          <p:nvPr/>
+        </p:nvPicPr>
+        <p:blipFill>
+          <a:blip r:embed="rId3"/>
+          <a:stretch>
+            <a:fillRect/>
+          </a:stretch>
+        </p:blipFill>
+        <p:spPr>
+          <a:xfrm>
+            <a:off x="5095652" y="2967461"/>
+            <a:ext cx="6557831" cy="2558054"/>
+          </a:xfrm>
+          <a:prstGeom prst="rect">
+            <a:avLst/>
+          </a:prstGeom>
+        </p:spPr>
+      </p:pic>
     </p:spTree>
     <p:extLst>
       <p:ext uri="{BB962C8B-B14F-4D97-AF65-F5344CB8AC3E}">

</xml_diff>